<commit_message>
powerpoint known issues edited, and added pirates pics for demo.
</commit_message>
<xml_diff>
--- a/Details.pptx
+++ b/Details.pptx
@@ -105,6 +105,11 @@
       </a:defRPr>
     </a:lvl9pPr>
   </p:defaultTextStyle>
+  <p:extLst>
+    <p:ext uri="{EFAFB233-063F-42B5-8137-9DF3F51BA10A}">
+      <p15:sldGuideLst xmlns:p15="http://schemas.microsoft.com/office/powerpoint/2012/main"/>
+    </p:ext>
+  </p:extLst>
 </p:presentation>
 </file>
 
@@ -5990,19 +5995,80 @@
           <a:p>
             <a:r>
               <a:rPr lang="he-IL" dirty="0"/>
-              <a:t>הצלחנו ליצור מטבע ולפזרו בין משתתפי הרשת, אך לא הצלחנו לבצע העברות </a:t>
-            </a:r>
-            <a:r>
-              <a:rPr lang="he-IL"/>
-              <a:t>בין המשתמשים </a:t>
-            </a:r>
+              <a:t>הצלחנו ליצור מטבע ולפזרו בין משתתפי הרשת, אך בביצוע העברה הקונה משלם באיטריום והמוכר מקבל את הכסף במטבע שיצרנו.</a:t>
+            </a:r>
+            <a:br>
+              <a:rPr lang="en-US" dirty="0"/>
+            </a:br>
             <a:r>
               <a:rPr lang="he-IL" dirty="0"/>
-              <a:t>(במקום ביצענו </a:t>
-            </a:r>
-            <a:r>
-              <a:rPr lang="he-IL"/>
-              <a:t>שימוש באיטריום).</a:t>
+              <a:t>זה נובע מכך שבפעולת הקנייה ב</a:t>
+            </a:r>
+            <a:r>
+              <a:rPr lang="en-US" dirty="0"/>
+              <a:t>solidity</a:t>
+            </a:r>
+            <a:r>
+              <a:rPr lang="he-IL" dirty="0"/>
+              <a:t> העברות מבוצעות באמצעות </a:t>
+            </a:r>
+            <a:r>
+              <a:rPr lang="en-US" dirty="0"/>
+              <a:t>transfer</a:t>
+            </a:r>
+            <a:r>
+              <a:rPr lang="he-IL" dirty="0"/>
+              <a:t> ולא </a:t>
+            </a:r>
+            <a:r>
+              <a:rPr lang="en-US" dirty="0" err="1"/>
+              <a:t>transferFrom</a:t>
+            </a:r>
+            <a:r>
+              <a:rPr lang="he-IL" dirty="0"/>
+              <a:t> ובכך כתובת החוזה היא זו שמשלמת במטבע שיצרנו.</a:t>
+            </a:r>
+            <a:br>
+              <a:rPr lang="en-US" dirty="0"/>
+            </a:br>
+            <a:r>
+              <a:rPr lang="he-IL" dirty="0"/>
+              <a:t>הפתרון לבעיה היא ביצוע </a:t>
+            </a:r>
+            <a:r>
+              <a:rPr lang="en-US" dirty="0"/>
+              <a:t>approve</a:t>
+            </a:r>
+            <a:r>
+              <a:rPr lang="he-IL" dirty="0"/>
+              <a:t> ע"י הקונה ובכך הוא </a:t>
+            </a:r>
+            <a:r>
+              <a:rPr lang="he-IL" dirty="0" err="1"/>
+              <a:t>יתן</a:t>
+            </a:r>
+            <a:r>
+              <a:rPr lang="he-IL" dirty="0"/>
+              <a:t> הרשאות ל</a:t>
+            </a:r>
+            <a:r>
+              <a:rPr lang="en-US" dirty="0"/>
+              <a:t>marketplace</a:t>
+            </a:r>
+            <a:r>
+              <a:rPr lang="he-IL" dirty="0"/>
+              <a:t> לבצע העברות בשמו.</a:t>
+            </a:r>
+            <a:br>
+              <a:rPr lang="en-US" dirty="0"/>
+            </a:br>
+            <a:r>
+              <a:rPr lang="he-IL" dirty="0"/>
+              <a:t>לא הצלחנו לממש את </a:t>
+            </a:r>
+            <a:r>
+              <a:rPr lang="he-IL"/>
+              <a:t>הפתרון עקב חוסר זמן.</a:t>
             </a:r>
             <a:endParaRPr lang="he-IL" dirty="0"/>
           </a:p>

</xml_diff>